<commit_message>
chore: made some corrections and added line refs
</commit_message>
<xml_diff>
--- a/docs/presentation.pptx
+++ b/docs/presentation.pptx
@@ -4506,7 +4506,7 @@
             <p:ph idx="1"/>
             <p:extLst>
               <p:ext uri="{D42A27DB-BD31-4B8C-83A1-F6EECF244321}">
-                <p14:modId xmlns:p14="http://schemas.microsoft.com/office/powerpoint/2010/main" val="3460794292"/>
+                <p14:modId xmlns:p14="http://schemas.microsoft.com/office/powerpoint/2010/main" val="2507679491"/>
               </p:ext>
             </p:extLst>
           </p:nvPr>
@@ -4761,14 +4761,17 @@
                         </a:rPr>
                         <a:t>drum.cs</a:t>
                       </a:r>
-                      <a:endParaRPr lang="en-US" sz="1600" b="1" dirty="0">
-                        <a:solidFill>
-                          <a:srgbClr val="EBDBB2"/>
-                        </a:solidFill>
-                        <a:latin typeface="Iosevka Etoile" panose="02000500030000000004" pitchFamily="2" charset="0"/>
-                        <a:ea typeface="Iosevka Etoile" panose="02000500030000000004" pitchFamily="2" charset="0"/>
-                        <a:cs typeface="Iosevka Etoile" panose="02000500030000000004" pitchFamily="2" charset="0"/>
-                      </a:endParaRPr>
+                      <a:r>
+                        <a:rPr lang="en-US" sz="1600" b="1" dirty="0">
+                          <a:solidFill>
+                            <a:srgbClr val="EBDBB2"/>
+                          </a:solidFill>
+                          <a:latin typeface="Iosevka Etoile" panose="02000500030000000004" pitchFamily="2" charset="0"/>
+                          <a:ea typeface="Iosevka Etoile" panose="02000500030000000004" pitchFamily="2" charset="0"/>
+                          <a:cs typeface="Iosevka Etoile" panose="02000500030000000004" pitchFamily="2" charset="0"/>
+                        </a:rPr>
+                        <a:t>: 59, 92, 116</a:t>
+                      </a:r>
                     </a:p>
                     <a:p>
                       <a:pPr marL="285750" indent="-285750">
@@ -4786,14 +4789,17 @@
                         </a:rPr>
                         <a:t>rhythm.cs</a:t>
                       </a:r>
-                      <a:endParaRPr lang="en-US" sz="1600" b="1" dirty="0">
-                        <a:solidFill>
-                          <a:srgbClr val="EBDBB2"/>
-                        </a:solidFill>
-                        <a:latin typeface="Iosevka Etoile" panose="02000500030000000004" pitchFamily="2" charset="0"/>
-                        <a:ea typeface="Iosevka Etoile" panose="02000500030000000004" pitchFamily="2" charset="0"/>
-                        <a:cs typeface="Iosevka Etoile" panose="02000500030000000004" pitchFamily="2" charset="0"/>
-                      </a:endParaRPr>
+                      <a:r>
+                        <a:rPr lang="en-US" sz="1600" b="1" dirty="0">
+                          <a:solidFill>
+                            <a:srgbClr val="EBDBB2"/>
+                          </a:solidFill>
+                          <a:latin typeface="Iosevka Etoile" panose="02000500030000000004" pitchFamily="2" charset="0"/>
+                          <a:ea typeface="Iosevka Etoile" panose="02000500030000000004" pitchFamily="2" charset="0"/>
+                          <a:cs typeface="Iosevka Etoile" panose="02000500030000000004" pitchFamily="2" charset="0"/>
+                        </a:rPr>
+                        <a:t>: 61</a:t>
+                      </a:r>
                     </a:p>
                     <a:p>
                       <a:pPr marL="285750" indent="-285750">
@@ -4990,13 +4996,24 @@
                       <a:r>
                         <a:rPr lang="en-US" sz="1200" dirty="0">
                           <a:solidFill>
-                            <a:srgbClr val="EBDBB2"/>
-                          </a:solidFill>
-                          <a:latin typeface="Iosevka Term" panose="02000509030000000004" pitchFamily="49" charset="0"/>
-                          <a:ea typeface="Iosevka Term" panose="02000509030000000004" pitchFamily="49" charset="0"/>
-                          <a:cs typeface="Iosevka Term" panose="02000509030000000004" pitchFamily="49" charset="0"/>
-                        </a:rPr>
-                        <a:t>timer </a:t>
+                            <a:srgbClr val="83A598"/>
+                          </a:solidFill>
+                          <a:latin typeface="Iosevka Term" panose="02000509030000000004" pitchFamily="49" charset="0"/>
+                          <a:ea typeface="Iosevka Term" panose="02000509030000000004" pitchFamily="49" charset="0"/>
+                          <a:cs typeface="Iosevka Term" panose="02000509030000000004" pitchFamily="49" charset="0"/>
+                        </a:rPr>
+                        <a:t>timer</a:t>
+                      </a:r>
+                      <a:r>
+                        <a:rPr lang="en-US" sz="1200" dirty="0">
+                          <a:solidFill>
+                            <a:srgbClr val="EBDBB2"/>
+                          </a:solidFill>
+                          <a:latin typeface="Iosevka Term" panose="02000509030000000004" pitchFamily="49" charset="0"/>
+                          <a:ea typeface="Iosevka Term" panose="02000509030000000004" pitchFamily="49" charset="0"/>
+                          <a:cs typeface="Iosevka Term" panose="02000509030000000004" pitchFamily="49" charset="0"/>
+                        </a:rPr>
+                        <a:t> </a:t>
                       </a:r>
                       <a:r>
                         <a:rPr lang="en-US" sz="1200" dirty="0">
@@ -5023,7 +5040,7 @@
                       <a:r>
                         <a:rPr lang="en-US" sz="1200" dirty="0" err="1">
                           <a:solidFill>
-                            <a:srgbClr val="EBDBB2"/>
+                            <a:srgbClr val="83A598"/>
                           </a:solidFill>
                           <a:latin typeface="Iosevka Term" panose="02000509030000000004" pitchFamily="49" charset="0"/>
                           <a:ea typeface="Iosevka Term" panose="02000509030000000004" pitchFamily="49" charset="0"/>
@@ -5034,13 +5051,24 @@
                       <a:r>
                         <a:rPr lang="en-US" sz="1200" dirty="0">
                           <a:solidFill>
-                            <a:srgbClr val="EBDBB2"/>
-                          </a:solidFill>
-                          <a:latin typeface="Iosevka Term" panose="02000509030000000004" pitchFamily="49" charset="0"/>
-                          <a:ea typeface="Iosevka Term" panose="02000509030000000004" pitchFamily="49" charset="0"/>
-                          <a:cs typeface="Iosevka Term" panose="02000509030000000004" pitchFamily="49" charset="0"/>
-                        </a:rPr>
-                        <a:t>) </a:t>
+                            <a:srgbClr val="FE8019"/>
+                          </a:solidFill>
+                          <a:latin typeface="Iosevka Term" panose="02000509030000000004" pitchFamily="49" charset="0"/>
+                          <a:ea typeface="Iosevka Term" panose="02000509030000000004" pitchFamily="49" charset="0"/>
+                          <a:cs typeface="Iosevka Term" panose="02000509030000000004" pitchFamily="49" charset="0"/>
+                        </a:rPr>
+                        <a:t>)</a:t>
+                      </a:r>
+                      <a:r>
+                        <a:rPr lang="en-US" sz="1200" dirty="0">
+                          <a:solidFill>
+                            <a:srgbClr val="EBDBB2"/>
+                          </a:solidFill>
+                          <a:latin typeface="Iosevka Term" panose="02000509030000000004" pitchFamily="49" charset="0"/>
+                          <a:ea typeface="Iosevka Term" panose="02000509030000000004" pitchFamily="49" charset="0"/>
+                          <a:cs typeface="Iosevka Term" panose="02000509030000000004" pitchFamily="49" charset="0"/>
+                        </a:rPr>
+                        <a:t> </a:t>
                       </a:r>
                       <a:r>
                         <a:rPr lang="en-US" sz="1200" dirty="0">
@@ -5064,7 +5092,29 @@
                           <a:ea typeface="Iosevka Term" panose="02000509030000000004" pitchFamily="49" charset="0"/>
                           <a:cs typeface="Iosevka Term" panose="02000509030000000004" pitchFamily="49" charset="0"/>
                         </a:rPr>
-                        <a:t>      timer </a:t>
+                        <a:t>      </a:t>
+                      </a:r>
+                      <a:r>
+                        <a:rPr lang="en-US" sz="1200" dirty="0">
+                          <a:solidFill>
+                            <a:srgbClr val="83A598"/>
+                          </a:solidFill>
+                          <a:latin typeface="Iosevka Term" panose="02000509030000000004" pitchFamily="49" charset="0"/>
+                          <a:ea typeface="Iosevka Term" panose="02000509030000000004" pitchFamily="49" charset="0"/>
+                          <a:cs typeface="Iosevka Term" panose="02000509030000000004" pitchFamily="49" charset="0"/>
+                        </a:rPr>
+                        <a:t>timer</a:t>
+                      </a:r>
+                      <a:r>
+                        <a:rPr lang="en-US" sz="1200" dirty="0">
+                          <a:solidFill>
+                            <a:srgbClr val="EBDBB2"/>
+                          </a:solidFill>
+                          <a:latin typeface="Iosevka Term" panose="02000509030000000004" pitchFamily="49" charset="0"/>
+                          <a:ea typeface="Iosevka Term" panose="02000509030000000004" pitchFamily="49" charset="0"/>
+                          <a:cs typeface="Iosevka Term" panose="02000509030000000004" pitchFamily="49" charset="0"/>
+                        </a:rPr>
+                        <a:t> </a:t>
                       </a:r>
                       <a:r>
                         <a:rPr lang="en-US" sz="1200" dirty="0">
@@ -5091,94 +5141,175 @@
                       <a:r>
                         <a:rPr lang="en-US" sz="1200" dirty="0" err="1">
                           <a:solidFill>
-                            <a:srgbClr val="EBDBB2"/>
-                          </a:solidFill>
-                          <a:latin typeface="Iosevka Term" panose="02000509030000000004" pitchFamily="49" charset="0"/>
-                          <a:ea typeface="Iosevka Term" panose="02000509030000000004" pitchFamily="49" charset="0"/>
-                          <a:cs typeface="Iosevka Term" panose="02000509030000000004" pitchFamily="49" charset="0"/>
-                        </a:rPr>
-                        <a:t>Time</a:t>
+                            <a:srgbClr val="FE8019"/>
+                          </a:solidFill>
+                          <a:latin typeface="Iosevka Term" panose="02000509030000000004" pitchFamily="49" charset="0"/>
+                          <a:ea typeface="Iosevka Term" panose="02000509030000000004" pitchFamily="49" charset="0"/>
+                          <a:cs typeface="Iosevka Term" panose="02000509030000000004" pitchFamily="49" charset="0"/>
+                        </a:rPr>
+                        <a:t>Time.</a:t>
                       </a:r>
                       <a:r>
                         <a:rPr lang="en-US" sz="1200" dirty="0" err="1">
                           <a:solidFill>
-                            <a:srgbClr val="FE8019"/>
-                          </a:solidFill>
-                          <a:latin typeface="Iosevka Term" panose="02000509030000000004" pitchFamily="49" charset="0"/>
-                          <a:ea typeface="Iosevka Term" panose="02000509030000000004" pitchFamily="49" charset="0"/>
-                          <a:cs typeface="Iosevka Term" panose="02000509030000000004" pitchFamily="49" charset="0"/>
-                        </a:rPr>
-                        <a:t>.</a:t>
+                            <a:srgbClr val="83A598"/>
+                          </a:solidFill>
+                          <a:latin typeface="Iosevka Term" panose="02000509030000000004" pitchFamily="49" charset="0"/>
+                          <a:ea typeface="Iosevka Term" panose="02000509030000000004" pitchFamily="49" charset="0"/>
+                          <a:cs typeface="Iosevka Term" panose="02000509030000000004" pitchFamily="49" charset="0"/>
+                        </a:rPr>
+                        <a:t>deltaTime</a:t>
+                      </a:r>
+                      <a:r>
+                        <a:rPr lang="en-US" sz="1200" dirty="0">
+                          <a:solidFill>
+                            <a:srgbClr val="FE8019"/>
+                          </a:solidFill>
+                          <a:latin typeface="Iosevka Term" panose="02000509030000000004" pitchFamily="49" charset="0"/>
+                          <a:ea typeface="Iosevka Term" panose="02000509030000000004" pitchFamily="49" charset="0"/>
+                          <a:cs typeface="Iosevka Term" panose="02000509030000000004" pitchFamily="49" charset="0"/>
+                        </a:rPr>
+                        <a:t>;</a:t>
+                      </a:r>
+                    </a:p>
+                    <a:p>
+                      <a:r>
+                        <a:rPr lang="en-US" sz="1200" dirty="0">
+                          <a:solidFill>
+                            <a:srgbClr val="EBDBB2"/>
+                          </a:solidFill>
+                          <a:latin typeface="Iosevka Term" panose="02000509030000000004" pitchFamily="49" charset="0"/>
+                          <a:ea typeface="Iosevka Term" panose="02000509030000000004" pitchFamily="49" charset="0"/>
+                          <a:cs typeface="Iosevka Term" panose="02000509030000000004" pitchFamily="49" charset="0"/>
+                        </a:rPr>
+                        <a:t>    </a:t>
+                      </a:r>
+                      <a:r>
+                        <a:rPr lang="en-US" sz="1200" dirty="0">
+                          <a:solidFill>
+                            <a:srgbClr val="FE8019"/>
+                          </a:solidFill>
+                          <a:latin typeface="Iosevka Term" panose="02000509030000000004" pitchFamily="49" charset="0"/>
+                          <a:ea typeface="Iosevka Term" panose="02000509030000000004" pitchFamily="49" charset="0"/>
+                          <a:cs typeface="Iosevka Term" panose="02000509030000000004" pitchFamily="49" charset="0"/>
+                        </a:rPr>
+                        <a:t>}</a:t>
+                      </a:r>
+                    </a:p>
+                    <a:p>
+                      <a:r>
+                        <a:rPr lang="en-US" sz="1200" dirty="0">
+                          <a:solidFill>
+                            <a:srgbClr val="EBDBB2"/>
+                          </a:solidFill>
+                          <a:latin typeface="Iosevka Term" panose="02000509030000000004" pitchFamily="49" charset="0"/>
+                          <a:ea typeface="Iosevka Term" panose="02000509030000000004" pitchFamily="49" charset="0"/>
+                          <a:cs typeface="Iosevka Term" panose="02000509030000000004" pitchFamily="49" charset="0"/>
+                        </a:rPr>
+                        <a:t>    </a:t>
+                      </a:r>
+                      <a:r>
+                        <a:rPr lang="en-US" sz="1200" dirty="0">
+                          <a:solidFill>
+                            <a:srgbClr val="FB4934"/>
+                          </a:solidFill>
+                          <a:latin typeface="Iosevka Term" panose="02000509030000000004" pitchFamily="49" charset="0"/>
+                          <a:ea typeface="Iosevka Term" panose="02000509030000000004" pitchFamily="49" charset="0"/>
+                          <a:cs typeface="Iosevka Term" panose="02000509030000000004" pitchFamily="49" charset="0"/>
+                        </a:rPr>
+                        <a:t>else</a:t>
+                      </a:r>
+                      <a:r>
+                        <a:rPr lang="en-US" sz="1200" dirty="0">
+                          <a:solidFill>
+                            <a:srgbClr val="EBDBB2"/>
+                          </a:solidFill>
+                          <a:latin typeface="Iosevka Term" panose="02000509030000000004" pitchFamily="49" charset="0"/>
+                          <a:ea typeface="Iosevka Term" panose="02000509030000000004" pitchFamily="49" charset="0"/>
+                          <a:cs typeface="Iosevka Term" panose="02000509030000000004" pitchFamily="49" charset="0"/>
+                        </a:rPr>
+                        <a:t> </a:t>
+                      </a:r>
+                      <a:r>
+                        <a:rPr lang="en-US" sz="1200" dirty="0">
+                          <a:solidFill>
+                            <a:srgbClr val="FE8019"/>
+                          </a:solidFill>
+                          <a:latin typeface="Iosevka Term" panose="02000509030000000004" pitchFamily="49" charset="0"/>
+                          <a:ea typeface="Iosevka Term" panose="02000509030000000004" pitchFamily="49" charset="0"/>
+                          <a:cs typeface="Iosevka Term" panose="02000509030000000004" pitchFamily="49" charset="0"/>
+                        </a:rPr>
+                        <a:t>{</a:t>
+                      </a:r>
+                      <a:r>
+                        <a:rPr lang="en-US" sz="1200" dirty="0">
+                          <a:solidFill>
+                            <a:srgbClr val="EBDBB2"/>
+                          </a:solidFill>
+                          <a:latin typeface="Iosevka Term" panose="02000509030000000004" pitchFamily="49" charset="0"/>
+                          <a:ea typeface="Iosevka Term" panose="02000509030000000004" pitchFamily="49" charset="0"/>
+                          <a:cs typeface="Iosevka Term" panose="02000509030000000004" pitchFamily="49" charset="0"/>
+                        </a:rPr>
+                        <a:t> </a:t>
+                      </a:r>
+                    </a:p>
+                    <a:p>
+                      <a:r>
+                        <a:rPr lang="en-US" sz="1200" dirty="0">
+                          <a:solidFill>
+                            <a:srgbClr val="EBDBB2"/>
+                          </a:solidFill>
+                          <a:latin typeface="Iosevka Term" panose="02000509030000000004" pitchFamily="49" charset="0"/>
+                          <a:ea typeface="Iosevka Term" panose="02000509030000000004" pitchFamily="49" charset="0"/>
+                          <a:cs typeface="Iosevka Term" panose="02000509030000000004" pitchFamily="49" charset="0"/>
+                        </a:rPr>
+                        <a:t>      </a:t>
                       </a:r>
                       <a:r>
                         <a:rPr lang="en-US" sz="1200" dirty="0" err="1">
                           <a:solidFill>
-                            <a:srgbClr val="EBDBB2"/>
-                          </a:solidFill>
-                          <a:latin typeface="Iosevka Term" panose="02000509030000000004" pitchFamily="49" charset="0"/>
-                          <a:ea typeface="Iosevka Term" panose="02000509030000000004" pitchFamily="49" charset="0"/>
-                          <a:cs typeface="Iosevka Term" panose="02000509030000000004" pitchFamily="49" charset="0"/>
-                        </a:rPr>
-                        <a:t>deltaTime</a:t>
-                      </a:r>
-                      <a:r>
-                        <a:rPr lang="en-US" sz="1200" dirty="0">
-                          <a:solidFill>
-                            <a:srgbClr val="FE8019"/>
-                          </a:solidFill>
-                          <a:latin typeface="Iosevka Term" panose="02000509030000000004" pitchFamily="49" charset="0"/>
-                          <a:ea typeface="Iosevka Term" panose="02000509030000000004" pitchFamily="49" charset="0"/>
-                          <a:cs typeface="Iosevka Term" panose="02000509030000000004" pitchFamily="49" charset="0"/>
-                        </a:rPr>
-                        <a:t>;</a:t>
-                      </a:r>
-                    </a:p>
-                    <a:p>
-                      <a:r>
-                        <a:rPr lang="en-US" sz="1200" dirty="0">
-                          <a:solidFill>
-                            <a:srgbClr val="EBDBB2"/>
-                          </a:solidFill>
-                          <a:latin typeface="Iosevka Term" panose="02000509030000000004" pitchFamily="49" charset="0"/>
-                          <a:ea typeface="Iosevka Term" panose="02000509030000000004" pitchFamily="49" charset="0"/>
-                          <a:cs typeface="Iosevka Term" panose="02000509030000000004" pitchFamily="49" charset="0"/>
-                        </a:rPr>
-                        <a:t>    </a:t>
-                      </a:r>
-                      <a:r>
-                        <a:rPr lang="en-US" sz="1200" dirty="0">
-                          <a:solidFill>
-                            <a:srgbClr val="FE8019"/>
-                          </a:solidFill>
-                          <a:latin typeface="Iosevka Term" panose="02000509030000000004" pitchFamily="49" charset="0"/>
-                          <a:ea typeface="Iosevka Term" panose="02000509030000000004" pitchFamily="49" charset="0"/>
-                          <a:cs typeface="Iosevka Term" panose="02000509030000000004" pitchFamily="49" charset="0"/>
-                        </a:rPr>
-                        <a:t>}</a:t>
-                      </a:r>
-                    </a:p>
-                    <a:p>
-                      <a:r>
-                        <a:rPr lang="en-US" sz="1200" dirty="0">
-                          <a:solidFill>
-                            <a:srgbClr val="EBDBB2"/>
-                          </a:solidFill>
-                          <a:latin typeface="Iosevka Term" panose="02000509030000000004" pitchFamily="49" charset="0"/>
-                          <a:ea typeface="Iosevka Term" panose="02000509030000000004" pitchFamily="49" charset="0"/>
-                          <a:cs typeface="Iosevka Term" panose="02000509030000000004" pitchFamily="49" charset="0"/>
-                        </a:rPr>
-                        <a:t>    </a:t>
-                      </a:r>
-                      <a:r>
-                        <a:rPr lang="en-US" sz="1200" dirty="0">
-                          <a:solidFill>
-                            <a:srgbClr val="FB4934"/>
-                          </a:solidFill>
-                          <a:latin typeface="Iosevka Term" panose="02000509030000000004" pitchFamily="49" charset="0"/>
-                          <a:ea typeface="Iosevka Term" panose="02000509030000000004" pitchFamily="49" charset="0"/>
-                          <a:cs typeface="Iosevka Term" panose="02000509030000000004" pitchFamily="49" charset="0"/>
-                        </a:rPr>
-                        <a:t>else</a:t>
+                            <a:srgbClr val="B8BB26"/>
+                          </a:solidFill>
+                          <a:latin typeface="Iosevka Term" panose="02000509030000000004" pitchFamily="49" charset="0"/>
+                          <a:ea typeface="Iosevka Term" panose="02000509030000000004" pitchFamily="49" charset="0"/>
+                          <a:cs typeface="Iosevka Term" panose="02000509030000000004" pitchFamily="49" charset="0"/>
+                        </a:rPr>
+                        <a:t>send_beat</a:t>
+                      </a:r>
+                      <a:r>
+                        <a:rPr lang="en-US" sz="1200" dirty="0">
+                          <a:solidFill>
+                            <a:srgbClr val="FE8019"/>
+                          </a:solidFill>
+                          <a:latin typeface="Iosevka Term" panose="02000509030000000004" pitchFamily="49" charset="0"/>
+                          <a:ea typeface="Iosevka Term" panose="02000509030000000004" pitchFamily="49" charset="0"/>
+                          <a:cs typeface="Iosevka Term" panose="02000509030000000004" pitchFamily="49" charset="0"/>
+                        </a:rPr>
+                        <a:t>();</a:t>
+                      </a:r>
+                    </a:p>
+                    <a:p>
+                      <a:r>
+                        <a:rPr lang="en-US" sz="1200" dirty="0">
+                          <a:solidFill>
+                            <a:srgbClr val="EBDBB2"/>
+                          </a:solidFill>
+                          <a:latin typeface="Iosevka Term" panose="02000509030000000004" pitchFamily="49" charset="0"/>
+                          <a:ea typeface="Iosevka Term" panose="02000509030000000004" pitchFamily="49" charset="0"/>
+                          <a:cs typeface="Iosevka Term" panose="02000509030000000004" pitchFamily="49" charset="0"/>
+                        </a:rPr>
+                        <a:t>      </a:t>
+                      </a:r>
+                      <a:r>
+                        <a:rPr lang="en-US" sz="1200" dirty="0">
+                          <a:solidFill>
+                            <a:srgbClr val="83A598"/>
+                          </a:solidFill>
+                          <a:latin typeface="Iosevka Term" panose="02000509030000000004" pitchFamily="49" charset="0"/>
+                          <a:ea typeface="Iosevka Term" panose="02000509030000000004" pitchFamily="49" charset="0"/>
+                          <a:cs typeface="Iosevka Term" panose="02000509030000000004" pitchFamily="49" charset="0"/>
+                        </a:rPr>
+                        <a:t>timer</a:t>
                       </a:r>
                       <a:r>
                         <a:rPr lang="en-US" sz="1200" dirty="0">
@@ -5190,76 +5321,6 @@
                           <a:cs typeface="Iosevka Term" panose="02000509030000000004" pitchFamily="49" charset="0"/>
                         </a:rPr>
                         <a:t> </a:t>
-                      </a:r>
-                      <a:r>
-                        <a:rPr lang="en-US" sz="1200" dirty="0">
-                          <a:solidFill>
-                            <a:srgbClr val="FE8019"/>
-                          </a:solidFill>
-                          <a:latin typeface="Iosevka Term" panose="02000509030000000004" pitchFamily="49" charset="0"/>
-                          <a:ea typeface="Iosevka Term" panose="02000509030000000004" pitchFamily="49" charset="0"/>
-                          <a:cs typeface="Iosevka Term" panose="02000509030000000004" pitchFamily="49" charset="0"/>
-                        </a:rPr>
-                        <a:t>{</a:t>
-                      </a:r>
-                      <a:r>
-                        <a:rPr lang="en-US" sz="1200" dirty="0">
-                          <a:solidFill>
-                            <a:srgbClr val="EBDBB2"/>
-                          </a:solidFill>
-                          <a:latin typeface="Iosevka Term" panose="02000509030000000004" pitchFamily="49" charset="0"/>
-                          <a:ea typeface="Iosevka Term" panose="02000509030000000004" pitchFamily="49" charset="0"/>
-                          <a:cs typeface="Iosevka Term" panose="02000509030000000004" pitchFamily="49" charset="0"/>
-                        </a:rPr>
-                        <a:t> </a:t>
-                      </a:r>
-                    </a:p>
-                    <a:p>
-                      <a:r>
-                        <a:rPr lang="en-US" sz="1200" dirty="0">
-                          <a:solidFill>
-                            <a:srgbClr val="EBDBB2"/>
-                          </a:solidFill>
-                          <a:latin typeface="Iosevka Term" panose="02000509030000000004" pitchFamily="49" charset="0"/>
-                          <a:ea typeface="Iosevka Term" panose="02000509030000000004" pitchFamily="49" charset="0"/>
-                          <a:cs typeface="Iosevka Term" panose="02000509030000000004" pitchFamily="49" charset="0"/>
-                        </a:rPr>
-                        <a:t>      </a:t>
-                      </a:r>
-                      <a:r>
-                        <a:rPr lang="en-US" sz="1200" dirty="0" err="1">
-                          <a:solidFill>
-                            <a:srgbClr val="B8BB26"/>
-                          </a:solidFill>
-                          <a:latin typeface="Iosevka Term" panose="02000509030000000004" pitchFamily="49" charset="0"/>
-                          <a:ea typeface="Iosevka Term" panose="02000509030000000004" pitchFamily="49" charset="0"/>
-                          <a:cs typeface="Iosevka Term" panose="02000509030000000004" pitchFamily="49" charset="0"/>
-                        </a:rPr>
-                        <a:t>send_beat</a:t>
-                      </a:r>
-                      <a:r>
-                        <a:rPr lang="en-US" sz="1200" dirty="0">
-                          <a:solidFill>
-                            <a:srgbClr val="FE8019"/>
-                          </a:solidFill>
-                          <a:latin typeface="Iosevka Term" panose="02000509030000000004" pitchFamily="49" charset="0"/>
-                          <a:ea typeface="Iosevka Term" panose="02000509030000000004" pitchFamily="49" charset="0"/>
-                          <a:cs typeface="Iosevka Term" panose="02000509030000000004" pitchFamily="49" charset="0"/>
-                        </a:rPr>
-                        <a:t>();</a:t>
-                      </a:r>
-                    </a:p>
-                    <a:p>
-                      <a:r>
-                        <a:rPr lang="en-US" sz="1200" dirty="0">
-                          <a:solidFill>
-                            <a:srgbClr val="EBDBB2"/>
-                          </a:solidFill>
-                          <a:latin typeface="Iosevka Term" panose="02000509030000000004" pitchFamily="49" charset="0"/>
-                          <a:ea typeface="Iosevka Term" panose="02000509030000000004" pitchFamily="49" charset="0"/>
-                          <a:cs typeface="Iosevka Term" panose="02000509030000000004" pitchFamily="49" charset="0"/>
-                        </a:rPr>
-                        <a:t>      timer </a:t>
                       </a:r>
                       <a:r>
                         <a:rPr lang="en-US" sz="1200" dirty="0">
@@ -5388,7 +5449,7 @@
                       <a:r>
                         <a:rPr lang="en-US" sz="1200" dirty="0" err="1">
                           <a:solidFill>
-                            <a:srgbClr val="EBDBB2"/>
+                            <a:srgbClr val="83A598"/>
                           </a:solidFill>
                           <a:latin typeface="Iosevka Term" panose="02000509030000000004" pitchFamily="49" charset="0"/>
                           <a:ea typeface="Iosevka Term" panose="02000509030000000004" pitchFamily="49" charset="0"/>
@@ -5454,13 +5515,24 @@
                       <a:r>
                         <a:rPr lang="en-US" sz="1200" dirty="0">
                           <a:solidFill>
-                            <a:srgbClr val="EBDBB2"/>
-                          </a:solidFill>
-                          <a:latin typeface="Iosevka Term" panose="02000509030000000004" pitchFamily="49" charset="0"/>
-                          <a:ea typeface="Iosevka Term" panose="02000509030000000004" pitchFamily="49" charset="0"/>
-                          <a:cs typeface="Iosevka Term" panose="02000509030000000004" pitchFamily="49" charset="0"/>
-                        </a:rPr>
-                        <a:t>combo </a:t>
+                            <a:srgbClr val="83A598"/>
+                          </a:solidFill>
+                          <a:latin typeface="Iosevka Term" panose="02000509030000000004" pitchFamily="49" charset="0"/>
+                          <a:ea typeface="Iosevka Term" panose="02000509030000000004" pitchFamily="49" charset="0"/>
+                          <a:cs typeface="Iosevka Term" panose="02000509030000000004" pitchFamily="49" charset="0"/>
+                        </a:rPr>
+                        <a:t>combo</a:t>
+                      </a:r>
+                      <a:r>
+                        <a:rPr lang="en-US" sz="1200" dirty="0">
+                          <a:solidFill>
+                            <a:srgbClr val="EBDBB2"/>
+                          </a:solidFill>
+                          <a:latin typeface="Iosevka Term" panose="02000509030000000004" pitchFamily="49" charset="0"/>
+                          <a:ea typeface="Iosevka Term" panose="02000509030000000004" pitchFamily="49" charset="0"/>
+                          <a:cs typeface="Iosevka Term" panose="02000509030000000004" pitchFamily="49" charset="0"/>
+                        </a:rPr>
+                        <a:t> </a:t>
                       </a:r>
                       <a:r>
                         <a:rPr lang="en-US" sz="1200" dirty="0">
@@ -5544,7 +5616,7 @@
                       <a:r>
                         <a:rPr lang="en-US" sz="1200" dirty="0" err="1">
                           <a:solidFill>
-                            <a:srgbClr val="EBDBB2"/>
+                            <a:srgbClr val="83A598"/>
                           </a:solidFill>
                           <a:latin typeface="Iosevka Term" panose="02000509030000000004" pitchFamily="49" charset="0"/>
                           <a:ea typeface="Iosevka Term" panose="02000509030000000004" pitchFamily="49" charset="0"/>
@@ -5566,7 +5638,7 @@
                       <a:r>
                         <a:rPr lang="en-US" sz="1200" dirty="0" err="1">
                           <a:solidFill>
-                            <a:srgbClr val="EBDBB2"/>
+                            <a:srgbClr val="83A598"/>
                           </a:solidFill>
                           <a:latin typeface="Iosevka Term" panose="02000509030000000004" pitchFamily="49" charset="0"/>
                           <a:ea typeface="Iosevka Term" panose="02000509030000000004" pitchFamily="49" charset="0"/>
@@ -5605,7 +5677,18 @@
                           <a:ea typeface="Iosevka Term" panose="02000509030000000004" pitchFamily="49" charset="0"/>
                           <a:cs typeface="Iosevka Term" panose="02000509030000000004" pitchFamily="49" charset="0"/>
                         </a:rPr>
-                        <a:t> loops</a:t>
+                        <a:t> </a:t>
+                      </a:r>
+                      <a:r>
+                        <a:rPr lang="en-US" sz="1200" dirty="0">
+                          <a:solidFill>
+                            <a:srgbClr val="83A598"/>
+                          </a:solidFill>
+                          <a:latin typeface="Iosevka Term" panose="02000509030000000004" pitchFamily="49" charset="0"/>
+                          <a:ea typeface="Iosevka Term" panose="02000509030000000004" pitchFamily="49" charset="0"/>
+                          <a:cs typeface="Iosevka Term" panose="02000509030000000004" pitchFamily="49" charset="0"/>
+                        </a:rPr>
+                        <a:t>loops</a:t>
                       </a:r>
                       <a:r>
                         <a:rPr lang="en-US" sz="1200" dirty="0">
@@ -5643,7 +5726,7 @@
                       <a:r>
                         <a:rPr lang="en-US" sz="1200" dirty="0">
                           <a:solidFill>
-                            <a:srgbClr val="EBDBB2"/>
+                            <a:srgbClr val="FABD2F"/>
                           </a:solidFill>
                           <a:latin typeface="Iosevka Term" panose="02000509030000000004" pitchFamily="49" charset="0"/>
                           <a:ea typeface="Iosevka Term" panose="02000509030000000004" pitchFamily="49" charset="0"/>
@@ -5665,7 +5748,7 @@
                       <a:r>
                         <a:rPr lang="en-US" sz="1200" dirty="0">
                           <a:solidFill>
-                            <a:srgbClr val="EBDBB2"/>
+                            <a:srgbClr val="D3869B"/>
                           </a:solidFill>
                           <a:latin typeface="Iosevka Term" panose="02000509030000000004" pitchFamily="49" charset="0"/>
                           <a:ea typeface="Iosevka Term" panose="02000509030000000004" pitchFamily="49" charset="0"/>
@@ -5733,7 +5816,7 @@
                       <a:r>
                         <a:rPr lang="en-US" sz="1200" dirty="0" err="1">
                           <a:solidFill>
-                            <a:srgbClr val="EBDBB2"/>
+                            <a:srgbClr val="83A598"/>
                           </a:solidFill>
                           <a:latin typeface="Iosevka Term" panose="02000509030000000004" pitchFamily="49" charset="0"/>
                           <a:ea typeface="Iosevka Term" panose="02000509030000000004" pitchFamily="49" charset="0"/>
@@ -5755,7 +5838,7 @@
                       <a:r>
                         <a:rPr lang="en-US" sz="1200" dirty="0" err="1">
                           <a:solidFill>
-                            <a:srgbClr val="EBDBB2"/>
+                            <a:srgbClr val="83A598"/>
                           </a:solidFill>
                           <a:latin typeface="Iosevka Term" panose="02000509030000000004" pitchFamily="49" charset="0"/>
                           <a:ea typeface="Iosevka Term" panose="02000509030000000004" pitchFamily="49" charset="0"/>
@@ -5810,7 +5893,7 @@
                       <a:r>
                         <a:rPr lang="en-US" sz="1200" dirty="0" err="1">
                           <a:solidFill>
-                            <a:srgbClr val="EBDBB2"/>
+                            <a:srgbClr val="83A598"/>
                           </a:solidFill>
                           <a:latin typeface="Iosevka Term" panose="02000509030000000004" pitchFamily="49" charset="0"/>
                           <a:ea typeface="Iosevka Term" panose="02000509030000000004" pitchFamily="49" charset="0"/>
@@ -5968,7 +6051,7 @@
                       <a:r>
                         <a:rPr lang="en-US" sz="1200" dirty="0" err="1">
                           <a:solidFill>
-                            <a:srgbClr val="EBDBB2"/>
+                            <a:srgbClr val="83A598"/>
                           </a:solidFill>
                           <a:latin typeface="Iosevka Term" panose="02000509030000000004" pitchFamily="49" charset="0"/>
                           <a:ea typeface="Iosevka Term" panose="02000509030000000004" pitchFamily="49" charset="0"/>
@@ -6034,13 +6117,24 @@
                       <a:r>
                         <a:rPr lang="en-US" sz="1200" dirty="0">
                           <a:solidFill>
-                            <a:srgbClr val="EBDBB2"/>
-                          </a:solidFill>
-                          <a:latin typeface="Iosevka Term" panose="02000509030000000004" pitchFamily="49" charset="0"/>
-                          <a:ea typeface="Iosevka Term" panose="02000509030000000004" pitchFamily="49" charset="0"/>
-                          <a:cs typeface="Iosevka Term" panose="02000509030000000004" pitchFamily="49" charset="0"/>
-                        </a:rPr>
-                        <a:t>combo </a:t>
+                            <a:srgbClr val="83A598"/>
+                          </a:solidFill>
+                          <a:latin typeface="Iosevka Term" panose="02000509030000000004" pitchFamily="49" charset="0"/>
+                          <a:ea typeface="Iosevka Term" panose="02000509030000000004" pitchFamily="49" charset="0"/>
+                          <a:cs typeface="Iosevka Term" panose="02000509030000000004" pitchFamily="49" charset="0"/>
+                        </a:rPr>
+                        <a:t>combo</a:t>
+                      </a:r>
+                      <a:r>
+                        <a:rPr lang="en-US" sz="1200" dirty="0">
+                          <a:solidFill>
+                            <a:srgbClr val="EBDBB2"/>
+                          </a:solidFill>
+                          <a:latin typeface="Iosevka Term" panose="02000509030000000004" pitchFamily="49" charset="0"/>
+                          <a:ea typeface="Iosevka Term" panose="02000509030000000004" pitchFamily="49" charset="0"/>
+                          <a:cs typeface="Iosevka Term" panose="02000509030000000004" pitchFamily="49" charset="0"/>
+                        </a:rPr>
+                        <a:t> </a:t>
                       </a:r>
                       <a:r>
                         <a:rPr lang="en-US" sz="1200" dirty="0">
@@ -6102,7 +6196,7 @@
                       <a:r>
                         <a:rPr lang="en-US" sz="1200" dirty="0" err="1">
                           <a:solidFill>
-                            <a:srgbClr val="EBDBB2"/>
+                            <a:srgbClr val="83A598"/>
                           </a:solidFill>
                           <a:latin typeface="Iosevka Term" panose="02000509030000000004" pitchFamily="49" charset="0"/>
                           <a:ea typeface="Iosevka Term" panose="02000509030000000004" pitchFamily="49" charset="0"/>
@@ -6124,7 +6218,7 @@
                       <a:r>
                         <a:rPr lang="en-US" sz="1200" dirty="0" err="1">
                           <a:solidFill>
-                            <a:srgbClr val="EBDBB2"/>
+                            <a:srgbClr val="83A598"/>
                           </a:solidFill>
                           <a:latin typeface="Iosevka Term" panose="02000509030000000004" pitchFamily="49" charset="0"/>
                           <a:ea typeface="Iosevka Term" panose="02000509030000000004" pitchFamily="49" charset="0"/>
@@ -6163,7 +6257,18 @@
                           <a:ea typeface="Iosevka Term" panose="02000509030000000004" pitchFamily="49" charset="0"/>
                           <a:cs typeface="Iosevka Term" panose="02000509030000000004" pitchFamily="49" charset="0"/>
                         </a:rPr>
-                        <a:t> loops</a:t>
+                        <a:t> </a:t>
+                      </a:r>
+                      <a:r>
+                        <a:rPr lang="en-US" sz="1200" dirty="0">
+                          <a:solidFill>
+                            <a:srgbClr val="83A598"/>
+                          </a:solidFill>
+                          <a:latin typeface="Iosevka Term" panose="02000509030000000004" pitchFamily="49" charset="0"/>
+                          <a:ea typeface="Iosevka Term" panose="02000509030000000004" pitchFamily="49" charset="0"/>
+                          <a:cs typeface="Iosevka Term" panose="02000509030000000004" pitchFamily="49" charset="0"/>
+                        </a:rPr>
+                        <a:t>loops</a:t>
                       </a:r>
                       <a:r>
                         <a:rPr lang="en-US" sz="1200" dirty="0">
@@ -6201,7 +6306,7 @@
                       <a:r>
                         <a:rPr lang="en-US" sz="1200" dirty="0">
                           <a:solidFill>
-                            <a:srgbClr val="EBDBB2"/>
+                            <a:srgbClr val="FABD2F"/>
                           </a:solidFill>
                           <a:latin typeface="Iosevka Term" panose="02000509030000000004" pitchFamily="49" charset="0"/>
                           <a:ea typeface="Iosevka Term" panose="02000509030000000004" pitchFamily="49" charset="0"/>
@@ -6223,7 +6328,7 @@
                       <a:r>
                         <a:rPr lang="en-US" sz="1200" dirty="0">
                           <a:solidFill>
-                            <a:srgbClr val="EBDBB2"/>
+                            <a:srgbClr val="D3869B"/>
                           </a:solidFill>
                           <a:latin typeface="Iosevka Term" panose="02000509030000000004" pitchFamily="49" charset="0"/>
                           <a:ea typeface="Iosevka Term" panose="02000509030000000004" pitchFamily="49" charset="0"/>
@@ -6291,7 +6396,7 @@
                       <a:r>
                         <a:rPr lang="en-US" sz="1200" dirty="0" err="1">
                           <a:solidFill>
-                            <a:srgbClr val="EBDBB2"/>
+                            <a:srgbClr val="83A598"/>
                           </a:solidFill>
                           <a:latin typeface="Iosevka Term" panose="02000509030000000004" pitchFamily="49" charset="0"/>
                           <a:ea typeface="Iosevka Term" panose="02000509030000000004" pitchFamily="49" charset="0"/>
@@ -6313,7 +6418,7 @@
                       <a:r>
                         <a:rPr lang="en-US" sz="1200" dirty="0" err="1">
                           <a:solidFill>
-                            <a:srgbClr val="EBDBB2"/>
+                            <a:srgbClr val="83A598"/>
                           </a:solidFill>
                           <a:latin typeface="Iosevka Term" panose="02000509030000000004" pitchFamily="49" charset="0"/>
                           <a:ea typeface="Iosevka Term" panose="02000509030000000004" pitchFamily="49" charset="0"/>
@@ -6346,7 +6451,7 @@
                       <a:r>
                         <a:rPr lang="en-US" sz="1200" dirty="0" err="1">
                           <a:solidFill>
-                            <a:srgbClr val="EBDBB2"/>
+                            <a:srgbClr val="83A598"/>
                           </a:solidFill>
                           <a:latin typeface="Iosevka Term" panose="02000509030000000004" pitchFamily="49" charset="0"/>
                           <a:ea typeface="Iosevka Term" panose="02000509030000000004" pitchFamily="49" charset="0"/>
@@ -6584,13 +6689,24 @@
                       <a:r>
                         <a:rPr lang="en-US" sz="1200" dirty="0">
                           <a:solidFill>
-                            <a:srgbClr val="EBDBB2"/>
-                          </a:solidFill>
-                          <a:latin typeface="Iosevka Term" panose="02000509030000000004" pitchFamily="49" charset="0"/>
-                          <a:ea typeface="Iosevka Term" panose="02000509030000000004" pitchFamily="49" charset="0"/>
-                          <a:cs typeface="Iosevka Term" panose="02000509030000000004" pitchFamily="49" charset="0"/>
-                        </a:rPr>
-                        <a:t>beat </a:t>
+                            <a:srgbClr val="83A598"/>
+                          </a:solidFill>
+                          <a:latin typeface="Iosevka Term" panose="02000509030000000004" pitchFamily="49" charset="0"/>
+                          <a:ea typeface="Iosevka Term" panose="02000509030000000004" pitchFamily="49" charset="0"/>
+                          <a:cs typeface="Iosevka Term" panose="02000509030000000004" pitchFamily="49" charset="0"/>
+                        </a:rPr>
+                        <a:t>beat</a:t>
+                      </a:r>
+                      <a:r>
+                        <a:rPr lang="en-US" sz="1200" dirty="0">
+                          <a:solidFill>
+                            <a:srgbClr val="EBDBB2"/>
+                          </a:solidFill>
+                          <a:latin typeface="Iosevka Term" panose="02000509030000000004" pitchFamily="49" charset="0"/>
+                          <a:ea typeface="Iosevka Term" panose="02000509030000000004" pitchFamily="49" charset="0"/>
+                          <a:cs typeface="Iosevka Term" panose="02000509030000000004" pitchFamily="49" charset="0"/>
+                        </a:rPr>
+                        <a:t> </a:t>
                       </a:r>
                       <a:r>
                         <a:rPr lang="en-US" sz="1200" dirty="0">
@@ -6696,7 +6812,7 @@
                       <a:r>
                         <a:rPr lang="en-US" sz="1200" dirty="0">
                           <a:solidFill>
-                            <a:srgbClr val="EBDBB2"/>
+                            <a:srgbClr val="83A598"/>
                           </a:solidFill>
                           <a:latin typeface="Iosevka Term" panose="02000509030000000004" pitchFamily="49" charset="0"/>
                           <a:ea typeface="Iosevka Term" panose="02000509030000000004" pitchFamily="49" charset="0"/>
@@ -6729,7 +6845,7 @@
                       <a:r>
                         <a:rPr lang="en-US" sz="1200" dirty="0" err="1">
                           <a:solidFill>
-                            <a:srgbClr val="EBDBB2"/>
+                            <a:srgbClr val="83A598"/>
                           </a:solidFill>
                           <a:latin typeface="Iosevka Term" panose="02000509030000000004" pitchFamily="49" charset="0"/>
                           <a:ea typeface="Iosevka Term" panose="02000509030000000004" pitchFamily="49" charset="0"/>
@@ -6751,7 +6867,7 @@
                       <a:r>
                         <a:rPr lang="en-US" sz="1200" dirty="0" err="1">
                           <a:solidFill>
-                            <a:srgbClr val="EBDBB2"/>
+                            <a:srgbClr val="83A598"/>
                           </a:solidFill>
                           <a:latin typeface="Iosevka Term" panose="02000509030000000004" pitchFamily="49" charset="0"/>
                           <a:ea typeface="Iosevka Term" panose="02000509030000000004" pitchFamily="49" charset="0"/>
@@ -6784,35 +6900,13 @@
                       <a:r>
                         <a:rPr lang="en-US" sz="1200" dirty="0" err="1">
                           <a:solidFill>
-                            <a:srgbClr val="EBDBB2"/>
-                          </a:solidFill>
-                          <a:latin typeface="Iosevka Term" panose="02000509030000000004" pitchFamily="49" charset="0"/>
-                          <a:ea typeface="Iosevka Term" panose="02000509030000000004" pitchFamily="49" charset="0"/>
-                          <a:cs typeface="Iosevka Term" panose="02000509030000000004" pitchFamily="49" charset="0"/>
-                        </a:rPr>
-                        <a:t>transform</a:t>
-                      </a:r>
-                      <a:r>
-                        <a:rPr lang="en-US" sz="1200" dirty="0" err="1">
-                          <a:solidFill>
-                            <a:srgbClr val="FE8019"/>
-                          </a:solidFill>
-                          <a:latin typeface="Iosevka Term" panose="02000509030000000004" pitchFamily="49" charset="0"/>
-                          <a:ea typeface="Iosevka Term" panose="02000509030000000004" pitchFamily="49" charset="0"/>
-                          <a:cs typeface="Iosevka Term" panose="02000509030000000004" pitchFamily="49" charset="0"/>
-                        </a:rPr>
-                        <a:t>.</a:t>
-                      </a:r>
-                      <a:r>
-                        <a:rPr lang="en-US" sz="1200" dirty="0" err="1">
-                          <a:solidFill>
-                            <a:srgbClr val="EBDBB2"/>
-                          </a:solidFill>
-                          <a:latin typeface="Iosevka Term" panose="02000509030000000004" pitchFamily="49" charset="0"/>
-                          <a:ea typeface="Iosevka Term" panose="02000509030000000004" pitchFamily="49" charset="0"/>
-                          <a:cs typeface="Iosevka Term" panose="02000509030000000004" pitchFamily="49" charset="0"/>
-                        </a:rPr>
-                        <a:t>rotation</a:t>
+                            <a:srgbClr val="83A598"/>
+                          </a:solidFill>
+                          <a:latin typeface="Iosevka Term" panose="02000509030000000004" pitchFamily="49" charset="0"/>
+                          <a:ea typeface="Iosevka Term" panose="02000509030000000004" pitchFamily="49" charset="0"/>
+                          <a:cs typeface="Iosevka Term" panose="02000509030000000004" pitchFamily="49" charset="0"/>
+                        </a:rPr>
+                        <a:t>transform.rotation</a:t>
                       </a:r>
                       <a:r>
                         <a:rPr lang="en-US" sz="1200" dirty="0">
@@ -7071,7 +7165,7 @@
             <p:ph idx="1"/>
             <p:extLst>
               <p:ext uri="{D42A27DB-BD31-4B8C-83A1-F6EECF244321}">
-                <p14:modId xmlns:p14="http://schemas.microsoft.com/office/powerpoint/2010/main" val="1707917539"/>
+                <p14:modId xmlns:p14="http://schemas.microsoft.com/office/powerpoint/2010/main" val="232877742"/>
               </p:ext>
             </p:extLst>
           </p:nvPr>
@@ -7295,14 +7389,17 @@
                         </a:rPr>
                         <a:t>button.cs</a:t>
                       </a:r>
-                      <a:endParaRPr lang="en-US" sz="1600" b="1" dirty="0">
-                        <a:solidFill>
-                          <a:srgbClr val="EBDBB2"/>
-                        </a:solidFill>
-                        <a:latin typeface="Iosevka Etoile" panose="02000500030000000004" pitchFamily="2" charset="0"/>
-                        <a:ea typeface="Iosevka Etoile" panose="02000500030000000004" pitchFamily="2" charset="0"/>
-                        <a:cs typeface="Iosevka Etoile" panose="02000500030000000004" pitchFamily="2" charset="0"/>
-                      </a:endParaRPr>
+                      <a:r>
+                        <a:rPr lang="en-US" sz="1600" b="1" dirty="0">
+                          <a:solidFill>
+                            <a:srgbClr val="EBDBB2"/>
+                          </a:solidFill>
+                          <a:latin typeface="Iosevka Etoile" panose="02000500030000000004" pitchFamily="2" charset="0"/>
+                          <a:ea typeface="Iosevka Etoile" panose="02000500030000000004" pitchFamily="2" charset="0"/>
+                          <a:cs typeface="Iosevka Etoile" panose="02000500030000000004" pitchFamily="2" charset="0"/>
+                        </a:rPr>
+                        <a:t>: 11</a:t>
+                      </a:r>
                     </a:p>
                     <a:p>
                       <a:pPr marL="285750" indent="-285750">
@@ -7320,14 +7417,17 @@
                         </a:rPr>
                         <a:t>beat.cs</a:t>
                       </a:r>
-                      <a:endParaRPr lang="en-US" sz="1600" b="1" dirty="0">
-                        <a:solidFill>
-                          <a:srgbClr val="EBDBB2"/>
-                        </a:solidFill>
-                        <a:latin typeface="Iosevka Etoile" panose="02000500030000000004" pitchFamily="2" charset="0"/>
-                        <a:ea typeface="Iosevka Etoile" panose="02000500030000000004" pitchFamily="2" charset="0"/>
-                        <a:cs typeface="Iosevka Etoile" panose="02000500030000000004" pitchFamily="2" charset="0"/>
-                      </a:endParaRPr>
+                      <a:r>
+                        <a:rPr lang="en-US" sz="1600" b="1" dirty="0">
+                          <a:solidFill>
+                            <a:srgbClr val="EBDBB2"/>
+                          </a:solidFill>
+                          <a:latin typeface="Iosevka Etoile" panose="02000500030000000004" pitchFamily="2" charset="0"/>
+                          <a:ea typeface="Iosevka Etoile" panose="02000500030000000004" pitchFamily="2" charset="0"/>
+                          <a:cs typeface="Iosevka Etoile" panose="02000500030000000004" pitchFamily="2" charset="0"/>
+                        </a:rPr>
+                        <a:t>: %</a:t>
+                      </a:r>
                     </a:p>
                   </a:txBody>
                   <a:tcPr>
@@ -9245,7 +9345,7 @@
             <p:ph idx="1"/>
             <p:extLst>
               <p:ext uri="{D42A27DB-BD31-4B8C-83A1-F6EECF244321}">
-                <p14:modId xmlns:p14="http://schemas.microsoft.com/office/powerpoint/2010/main" val="527548488"/>
+                <p14:modId xmlns:p14="http://schemas.microsoft.com/office/powerpoint/2010/main" val="3800401272"/>
               </p:ext>
             </p:extLst>
           </p:nvPr>
@@ -9414,7 +9514,7 @@
                         <a:buChar char="-"/>
                       </a:pPr>
                       <a:r>
-                        <a:rPr lang="en-US" sz="1600" b="0">
+                        <a:rPr lang="en-US" sz="1600" b="0" dirty="0">
                           <a:solidFill>
                             <a:srgbClr val="EBDBB2"/>
                           </a:solidFill>
@@ -9422,18 +9522,7 @@
                           <a:ea typeface="Iosevka Etoile" panose="02000500030000000004" pitchFamily="2" charset="0"/>
                           <a:cs typeface="Iosevka Etoile" panose="02000500030000000004" pitchFamily="2" charset="0"/>
                         </a:rPr>
-                        <a:t>Supports </a:t>
-                      </a:r>
-                      <a:r>
-                        <a:rPr lang="en-US" sz="1600" b="0" dirty="0">
-                          <a:solidFill>
-                            <a:srgbClr val="EBDBB2"/>
-                          </a:solidFill>
-                          <a:latin typeface="Iosevka Etoile" panose="02000500030000000004" pitchFamily="2" charset="0"/>
-                          <a:ea typeface="Iosevka Etoile" panose="02000500030000000004" pitchFamily="2" charset="0"/>
-                          <a:cs typeface="Iosevka Etoile" panose="02000500030000000004" pitchFamily="2" charset="0"/>
-                        </a:rPr>
-                        <a:t>unimplemented reset   </a:t>
+                        <a:t>Supports unimplemented reset   </a:t>
                       </a:r>
                     </a:p>
                     <a:p>
@@ -9480,14 +9569,17 @@
                         </a:rPr>
                         <a:t>rhythm.cs</a:t>
                       </a:r>
-                      <a:endParaRPr lang="en-US" sz="1600" b="1" dirty="0">
-                        <a:solidFill>
-                          <a:srgbClr val="EBDBB2"/>
-                        </a:solidFill>
-                        <a:latin typeface="Iosevka Etoile" panose="02000500030000000004" pitchFamily="2" charset="0"/>
-                        <a:ea typeface="Iosevka Etoile" panose="02000500030000000004" pitchFamily="2" charset="0"/>
-                        <a:cs typeface="Iosevka Etoile" panose="02000500030000000004" pitchFamily="2" charset="0"/>
-                      </a:endParaRPr>
+                      <a:r>
+                        <a:rPr lang="en-US" sz="1600" b="1" dirty="0">
+                          <a:solidFill>
+                            <a:srgbClr val="EBDBB2"/>
+                          </a:solidFill>
+                          <a:latin typeface="Iosevka Etoile" panose="02000500030000000004" pitchFamily="2" charset="0"/>
+                          <a:ea typeface="Iosevka Etoile" panose="02000500030000000004" pitchFamily="2" charset="0"/>
+                          <a:cs typeface="Iosevka Etoile" panose="02000500030000000004" pitchFamily="2" charset="0"/>
+                        </a:rPr>
+                        <a:t>: %</a:t>
+                      </a:r>
                     </a:p>
                     <a:p>
                       <a:pPr marL="285750" indent="-285750">
@@ -9505,14 +9597,17 @@
                         </a:rPr>
                         <a:t>drum.cs</a:t>
                       </a:r>
-                      <a:endParaRPr lang="en-US" sz="1600" b="1" dirty="0">
-                        <a:solidFill>
-                          <a:srgbClr val="EBDBB2"/>
-                        </a:solidFill>
-                        <a:latin typeface="Iosevka Etoile" panose="02000500030000000004" pitchFamily="2" charset="0"/>
-                        <a:ea typeface="Iosevka Etoile" panose="02000500030000000004" pitchFamily="2" charset="0"/>
-                        <a:cs typeface="Iosevka Etoile" panose="02000500030000000004" pitchFamily="2" charset="0"/>
-                      </a:endParaRPr>
+                      <a:r>
+                        <a:rPr lang="en-US" sz="1600" b="1" dirty="0">
+                          <a:solidFill>
+                            <a:srgbClr val="EBDBB2"/>
+                          </a:solidFill>
+                          <a:latin typeface="Iosevka Etoile" panose="02000500030000000004" pitchFamily="2" charset="0"/>
+                          <a:ea typeface="Iosevka Etoile" panose="02000500030000000004" pitchFamily="2" charset="0"/>
+                          <a:cs typeface="Iosevka Etoile" panose="02000500030000000004" pitchFamily="2" charset="0"/>
+                        </a:rPr>
+                        <a:t>: 20, 84, 157</a:t>
+                      </a:r>
                     </a:p>
                   </a:txBody>
                   <a:tcPr>
@@ -9616,7 +9711,7 @@
                       <a:r>
                         <a:rPr lang="en-US" sz="1200" dirty="0" err="1">
                           <a:solidFill>
-                            <a:srgbClr val="EBDBB2"/>
+                            <a:srgbClr val="FE8019"/>
                           </a:solidFill>
                           <a:latin typeface="Iosevka Term" panose="02000509030000000004" pitchFamily="49" charset="0"/>
                           <a:ea typeface="Iosevka Term" panose="02000509030000000004" pitchFamily="49" charset="0"/>
@@ -9757,7 +9852,18 @@
                           <a:ea typeface="Iosevka Term" panose="02000509030000000004" pitchFamily="49" charset="0"/>
                           <a:cs typeface="Iosevka Term" panose="02000509030000000004" pitchFamily="49" charset="0"/>
                         </a:rPr>
-                        <a:t>    Begin01</a:t>
+                        <a:t>  </a:t>
+                      </a:r>
+                      <a:r>
+                        <a:rPr lang="en-US" sz="1200" dirty="0">
+                          <a:solidFill>
+                            <a:srgbClr val="D3869B"/>
+                          </a:solidFill>
+                          <a:latin typeface="Iosevka Term" panose="02000509030000000004" pitchFamily="49" charset="0"/>
+                          <a:ea typeface="Iosevka Term" panose="02000509030000000004" pitchFamily="49" charset="0"/>
+                          <a:cs typeface="Iosevka Term" panose="02000509030000000004" pitchFamily="49" charset="0"/>
+                        </a:rPr>
+                        <a:t>Begin01</a:t>
                       </a:r>
                       <a:r>
                         <a:rPr lang="en-US" sz="1200" dirty="0">
@@ -9781,7 +9887,18 @@
                           <a:ea typeface="Iosevka Term" panose="02000509030000000004" pitchFamily="49" charset="0"/>
                           <a:cs typeface="Iosevka Term" panose="02000509030000000004" pitchFamily="49" charset="0"/>
                         </a:rPr>
-                        <a:t>    Begin02</a:t>
+                        <a:t>  </a:t>
+                      </a:r>
+                      <a:r>
+                        <a:rPr lang="en-US" sz="1200" dirty="0">
+                          <a:solidFill>
+                            <a:srgbClr val="D3869B"/>
+                          </a:solidFill>
+                          <a:latin typeface="Iosevka Term" panose="02000509030000000004" pitchFamily="49" charset="0"/>
+                          <a:ea typeface="Iosevka Term" panose="02000509030000000004" pitchFamily="49" charset="0"/>
+                          <a:cs typeface="Iosevka Term" panose="02000509030000000004" pitchFamily="49" charset="0"/>
+                        </a:rPr>
+                        <a:t>Begin02</a:t>
                       </a:r>
                       <a:r>
                         <a:rPr lang="en-US" sz="1200" dirty="0">
@@ -9805,7 +9922,18 @@
                           <a:ea typeface="Iosevka Term" panose="02000509030000000004" pitchFamily="49" charset="0"/>
                           <a:cs typeface="Iosevka Term" panose="02000509030000000004" pitchFamily="49" charset="0"/>
                         </a:rPr>
-                        <a:t>    Combo01</a:t>
+                        <a:t>  </a:t>
+                      </a:r>
+                      <a:r>
+                        <a:rPr lang="en-US" sz="1200" dirty="0">
+                          <a:solidFill>
+                            <a:srgbClr val="D3869B"/>
+                          </a:solidFill>
+                          <a:latin typeface="Iosevka Term" panose="02000509030000000004" pitchFamily="49" charset="0"/>
+                          <a:ea typeface="Iosevka Term" panose="02000509030000000004" pitchFamily="49" charset="0"/>
+                          <a:cs typeface="Iosevka Term" panose="02000509030000000004" pitchFamily="49" charset="0"/>
+                        </a:rPr>
+                        <a:t>Combo01</a:t>
                       </a:r>
                       <a:r>
                         <a:rPr lang="en-US" sz="1200" dirty="0">
@@ -9829,7 +9957,18 @@
                           <a:ea typeface="Iosevka Term" panose="02000509030000000004" pitchFamily="49" charset="0"/>
                           <a:cs typeface="Iosevka Term" panose="02000509030000000004" pitchFamily="49" charset="0"/>
                         </a:rPr>
-                        <a:t>    Combo02</a:t>
+                        <a:t>  </a:t>
+                      </a:r>
+                      <a:r>
+                        <a:rPr lang="en-US" sz="1200" dirty="0">
+                          <a:solidFill>
+                            <a:srgbClr val="D3869B"/>
+                          </a:solidFill>
+                          <a:latin typeface="Iosevka Term" panose="02000509030000000004" pitchFamily="49" charset="0"/>
+                          <a:ea typeface="Iosevka Term" panose="02000509030000000004" pitchFamily="49" charset="0"/>
+                          <a:cs typeface="Iosevka Term" panose="02000509030000000004" pitchFamily="49" charset="0"/>
+                        </a:rPr>
+                        <a:t>Combo02</a:t>
                       </a:r>
                       <a:r>
                         <a:rPr lang="en-US" sz="1200" dirty="0">
@@ -9853,7 +9992,18 @@
                           <a:ea typeface="Iosevka Term" panose="02000509030000000004" pitchFamily="49" charset="0"/>
                           <a:cs typeface="Iosevka Term" panose="02000509030000000004" pitchFamily="49" charset="0"/>
                         </a:rPr>
-                        <a:t>    Combo03</a:t>
+                        <a:t>  </a:t>
+                      </a:r>
+                      <a:r>
+                        <a:rPr lang="en-US" sz="1200" dirty="0">
+                          <a:solidFill>
+                            <a:srgbClr val="D3869B"/>
+                          </a:solidFill>
+                          <a:latin typeface="Iosevka Term" panose="02000509030000000004" pitchFamily="49" charset="0"/>
+                          <a:ea typeface="Iosevka Term" panose="02000509030000000004" pitchFamily="49" charset="0"/>
+                          <a:cs typeface="Iosevka Term" panose="02000509030000000004" pitchFamily="49" charset="0"/>
+                        </a:rPr>
+                        <a:t>Combo03</a:t>
                       </a:r>
                       <a:r>
                         <a:rPr lang="en-US" sz="1200" dirty="0">
@@ -9877,7 +10027,18 @@
                           <a:ea typeface="Iosevka Term" panose="02000509030000000004" pitchFamily="49" charset="0"/>
                           <a:cs typeface="Iosevka Term" panose="02000509030000000004" pitchFamily="49" charset="0"/>
                         </a:rPr>
-                        <a:t>    Fever01</a:t>
+                        <a:t>  </a:t>
+                      </a:r>
+                      <a:r>
+                        <a:rPr lang="en-US" sz="1200" dirty="0">
+                          <a:solidFill>
+                            <a:srgbClr val="D3869B"/>
+                          </a:solidFill>
+                          <a:latin typeface="Iosevka Term" panose="02000509030000000004" pitchFamily="49" charset="0"/>
+                          <a:ea typeface="Iosevka Term" panose="02000509030000000004" pitchFamily="49" charset="0"/>
+                          <a:cs typeface="Iosevka Term" panose="02000509030000000004" pitchFamily="49" charset="0"/>
+                        </a:rPr>
+                        <a:t>Fever01</a:t>
                       </a:r>
                       <a:r>
                         <a:rPr lang="en-US" sz="1200" dirty="0">
@@ -9901,20 +10062,31 @@
                           <a:ea typeface="Iosevka Term" panose="02000509030000000004" pitchFamily="49" charset="0"/>
                           <a:cs typeface="Iosevka Term" panose="02000509030000000004" pitchFamily="49" charset="0"/>
                         </a:rPr>
-                        <a:t>    Fever02</a:t>
-                      </a:r>
-                    </a:p>
-                    <a:p>
-                      <a:r>
-                        <a:rPr lang="en-US" sz="1200" dirty="0">
-                          <a:solidFill>
-                            <a:srgbClr val="EBDBB2"/>
-                          </a:solidFill>
-                          <a:latin typeface="Iosevka Term" panose="02000509030000000004" pitchFamily="49" charset="0"/>
-                          <a:ea typeface="Iosevka Term" panose="02000509030000000004" pitchFamily="49" charset="0"/>
-                          <a:cs typeface="Iosevka Term" panose="02000509030000000004" pitchFamily="49" charset="0"/>
-                        </a:rPr>
                         <a:t>  </a:t>
+                      </a:r>
+                      <a:r>
+                        <a:rPr lang="en-US" sz="1200" dirty="0">
+                          <a:solidFill>
+                            <a:srgbClr val="D3869B"/>
+                          </a:solidFill>
+                          <a:latin typeface="Iosevka Term" panose="02000509030000000004" pitchFamily="49" charset="0"/>
+                          <a:ea typeface="Iosevka Term" panose="02000509030000000004" pitchFamily="49" charset="0"/>
+                          <a:cs typeface="Iosevka Term" panose="02000509030000000004" pitchFamily="49" charset="0"/>
+                        </a:rPr>
+                        <a:t>Fever02</a:t>
+                      </a:r>
+                    </a:p>
+                    <a:p>
+                      <a:r>
+                        <a:rPr lang="en-US" sz="1200" dirty="0">
+                          <a:solidFill>
+                            <a:srgbClr val="EBDBB2"/>
+                          </a:solidFill>
+                          <a:latin typeface="Iosevka Term" panose="02000509030000000004" pitchFamily="49" charset="0"/>
+                          <a:ea typeface="Iosevka Term" panose="02000509030000000004" pitchFamily="49" charset="0"/>
+                          <a:cs typeface="Iosevka Term" panose="02000509030000000004" pitchFamily="49" charset="0"/>
+                        </a:rPr>
+                        <a:t> </a:t>
                       </a:r>
                       <a:r>
                         <a:rPr lang="en-US" sz="1200" dirty="0">
@@ -9948,7 +10120,29 @@
                           <a:ea typeface="Iosevka Term" panose="02000509030000000004" pitchFamily="49" charset="0"/>
                           <a:cs typeface="Iosevka Term" panose="02000509030000000004" pitchFamily="49" charset="0"/>
                         </a:rPr>
-                        <a:t> if </a:t>
+                        <a:t>   </a:t>
+                      </a:r>
+                      <a:r>
+                        <a:rPr lang="en-US" sz="1200" dirty="0">
+                          <a:solidFill>
+                            <a:srgbClr val="FB4934"/>
+                          </a:solidFill>
+                          <a:latin typeface="Iosevka Term" panose="02000509030000000004" pitchFamily="49" charset="0"/>
+                          <a:ea typeface="Iosevka Term" panose="02000509030000000004" pitchFamily="49" charset="0"/>
+                          <a:cs typeface="Iosevka Term" panose="02000509030000000004" pitchFamily="49" charset="0"/>
+                        </a:rPr>
+                        <a:t>if</a:t>
+                      </a:r>
+                      <a:r>
+                        <a:rPr lang="en-US" sz="1200" dirty="0">
+                          <a:solidFill>
+                            <a:srgbClr val="EBDBB2"/>
+                          </a:solidFill>
+                          <a:latin typeface="Iosevka Term" panose="02000509030000000004" pitchFamily="49" charset="0"/>
+                          <a:ea typeface="Iosevka Term" panose="02000509030000000004" pitchFamily="49" charset="0"/>
+                          <a:cs typeface="Iosevka Term" panose="02000509030000000004" pitchFamily="49" charset="0"/>
+                        </a:rPr>
+                        <a:t> </a:t>
                       </a:r>
                       <a:r>
                         <a:rPr lang="en-US" sz="1200" dirty="0">
@@ -9964,7 +10158,7 @@
                       <a:r>
                         <a:rPr lang="en-US" sz="1200" dirty="0" err="1">
                           <a:solidFill>
-                            <a:srgbClr val="EBDBB2"/>
+                            <a:srgbClr val="83A598"/>
                           </a:solidFill>
                           <a:latin typeface="Iosevka Term" panose="02000509030000000004" pitchFamily="49" charset="0"/>
                           <a:ea typeface="Iosevka Term" panose="02000509030000000004" pitchFamily="49" charset="0"/>
@@ -10030,13 +10224,24 @@
                       <a:r>
                         <a:rPr lang="en-US" sz="1200" dirty="0">
                           <a:solidFill>
-                            <a:srgbClr val="EBDBB2"/>
-                          </a:solidFill>
-                          <a:latin typeface="Iosevka Term" panose="02000509030000000004" pitchFamily="49" charset="0"/>
-                          <a:ea typeface="Iosevka Term" panose="02000509030000000004" pitchFamily="49" charset="0"/>
-                          <a:cs typeface="Iosevka Term" panose="02000509030000000004" pitchFamily="49" charset="0"/>
-                        </a:rPr>
-                        <a:t>combo </a:t>
+                            <a:srgbClr val="83A598"/>
+                          </a:solidFill>
+                          <a:latin typeface="Iosevka Term" panose="02000509030000000004" pitchFamily="49" charset="0"/>
+                          <a:ea typeface="Iosevka Term" panose="02000509030000000004" pitchFamily="49" charset="0"/>
+                          <a:cs typeface="Iosevka Term" panose="02000509030000000004" pitchFamily="49" charset="0"/>
+                        </a:rPr>
+                        <a:t>combo</a:t>
+                      </a:r>
+                      <a:r>
+                        <a:rPr lang="en-US" sz="1200" dirty="0">
+                          <a:solidFill>
+                            <a:srgbClr val="EBDBB2"/>
+                          </a:solidFill>
+                          <a:latin typeface="Iosevka Term" panose="02000509030000000004" pitchFamily="49" charset="0"/>
+                          <a:ea typeface="Iosevka Term" panose="02000509030000000004" pitchFamily="49" charset="0"/>
+                          <a:cs typeface="Iosevka Term" panose="02000509030000000004" pitchFamily="49" charset="0"/>
+                        </a:rPr>
+                        <a:t> </a:t>
                       </a:r>
                       <a:r>
                         <a:rPr lang="en-US" sz="1200" dirty="0">
@@ -10093,12 +10298,12 @@
                           <a:ea typeface="Iosevka Term" panose="02000509030000000004" pitchFamily="49" charset="0"/>
                           <a:cs typeface="Iosevka Term" panose="02000509030000000004" pitchFamily="49" charset="0"/>
                         </a:rPr>
-                        <a:t>      </a:t>
+                        <a:t>    </a:t>
                       </a:r>
                       <a:r>
                         <a:rPr lang="en-US" sz="1200" dirty="0" err="1">
                           <a:solidFill>
-                            <a:srgbClr val="EBDBB2"/>
+                            <a:srgbClr val="83A598"/>
                           </a:solidFill>
                           <a:latin typeface="Iosevka Term" panose="02000509030000000004" pitchFamily="49" charset="0"/>
                           <a:ea typeface="Iosevka Term" panose="02000509030000000004" pitchFamily="49" charset="0"/>
@@ -10120,7 +10325,7 @@
                       <a:r>
                         <a:rPr lang="en-US" sz="1200" dirty="0" err="1">
                           <a:solidFill>
-                            <a:srgbClr val="EBDBB2"/>
+                            <a:srgbClr val="83A598"/>
                           </a:solidFill>
                           <a:latin typeface="Iosevka Term" panose="02000509030000000004" pitchFamily="49" charset="0"/>
                           <a:ea typeface="Iosevka Term" panose="02000509030000000004" pitchFamily="49" charset="0"/>
@@ -10159,7 +10364,18 @@
                           <a:ea typeface="Iosevka Term" panose="02000509030000000004" pitchFamily="49" charset="0"/>
                           <a:cs typeface="Iosevka Term" panose="02000509030000000004" pitchFamily="49" charset="0"/>
                         </a:rPr>
-                        <a:t> loops</a:t>
+                        <a:t> </a:t>
+                      </a:r>
+                      <a:r>
+                        <a:rPr lang="en-US" sz="1200" dirty="0">
+                          <a:solidFill>
+                            <a:srgbClr val="83A598"/>
+                          </a:solidFill>
+                          <a:latin typeface="Iosevka Term" panose="02000509030000000004" pitchFamily="49" charset="0"/>
+                          <a:ea typeface="Iosevka Term" panose="02000509030000000004" pitchFamily="49" charset="0"/>
+                          <a:cs typeface="Iosevka Term" panose="02000509030000000004" pitchFamily="49" charset="0"/>
+                        </a:rPr>
+                        <a:t>loops</a:t>
                       </a:r>
                       <a:r>
                         <a:rPr lang="en-US" sz="1200" dirty="0">
@@ -10197,7 +10413,7 @@
                       <a:r>
                         <a:rPr lang="en-US" sz="1200" dirty="0">
                           <a:solidFill>
-                            <a:srgbClr val="EBDBB2"/>
+                            <a:srgbClr val="FABD2F"/>
                           </a:solidFill>
                           <a:latin typeface="Iosevka Term" panose="02000509030000000004" pitchFamily="49" charset="0"/>
                           <a:ea typeface="Iosevka Term" panose="02000509030000000004" pitchFamily="49" charset="0"/>
@@ -10219,7 +10435,7 @@
                       <a:r>
                         <a:rPr lang="en-US" sz="1200" dirty="0">
                           <a:solidFill>
-                            <a:srgbClr val="EBDBB2"/>
+                            <a:srgbClr val="D3869B"/>
                           </a:solidFill>
                           <a:latin typeface="Iosevka Term" panose="02000509030000000004" pitchFamily="49" charset="0"/>
                           <a:ea typeface="Iosevka Term" panose="02000509030000000004" pitchFamily="49" charset="0"/>
@@ -10249,7 +10465,29 @@
                           <a:ea typeface="Iosevka Term" panose="02000509030000000004" pitchFamily="49" charset="0"/>
                           <a:cs typeface="Iosevka Term" panose="02000509030000000004" pitchFamily="49" charset="0"/>
                         </a:rPr>
-                        <a:t>      if </a:t>
+                        <a:t>    </a:t>
+                      </a:r>
+                      <a:r>
+                        <a:rPr lang="en-US" sz="1200" dirty="0">
+                          <a:solidFill>
+                            <a:srgbClr val="FB4934"/>
+                          </a:solidFill>
+                          <a:latin typeface="Iosevka Term" panose="02000509030000000004" pitchFamily="49" charset="0"/>
+                          <a:ea typeface="Iosevka Term" panose="02000509030000000004" pitchFamily="49" charset="0"/>
+                          <a:cs typeface="Iosevka Term" panose="02000509030000000004" pitchFamily="49" charset="0"/>
+                        </a:rPr>
+                        <a:t>if</a:t>
+                      </a:r>
+                      <a:r>
+                        <a:rPr lang="en-US" sz="1200" dirty="0">
+                          <a:solidFill>
+                            <a:srgbClr val="EBDBB2"/>
+                          </a:solidFill>
+                          <a:latin typeface="Iosevka Term" panose="02000509030000000004" pitchFamily="49" charset="0"/>
+                          <a:ea typeface="Iosevka Term" panose="02000509030000000004" pitchFamily="49" charset="0"/>
+                          <a:cs typeface="Iosevka Term" panose="02000509030000000004" pitchFamily="49" charset="0"/>
+                        </a:rPr>
+                        <a:t> </a:t>
                       </a:r>
                       <a:r>
                         <a:rPr lang="en-US" sz="1200" dirty="0">
@@ -10265,7 +10503,7 @@
                       <a:r>
                         <a:rPr lang="en-US" sz="1200" dirty="0" err="1">
                           <a:solidFill>
-                            <a:srgbClr val="EBDBB2"/>
+                            <a:srgbClr val="83A598"/>
                           </a:solidFill>
                           <a:latin typeface="Iosevka Term" panose="02000509030000000004" pitchFamily="49" charset="0"/>
                           <a:ea typeface="Iosevka Term" panose="02000509030000000004" pitchFamily="49" charset="0"/>
@@ -10287,7 +10525,7 @@
                       <a:r>
                         <a:rPr lang="en-US" sz="1200" dirty="0" err="1">
                           <a:solidFill>
-                            <a:srgbClr val="EBDBB2"/>
+                            <a:srgbClr val="83A598"/>
                           </a:solidFill>
                           <a:latin typeface="Iosevka Term" panose="02000509030000000004" pitchFamily="49" charset="0"/>
                           <a:ea typeface="Iosevka Term" panose="02000509030000000004" pitchFamily="49" charset="0"/>
@@ -10342,7 +10580,7 @@
                       <a:r>
                         <a:rPr lang="en-US" sz="1200" dirty="0" err="1">
                           <a:solidFill>
-                            <a:srgbClr val="EBDBB2"/>
+                            <a:srgbClr val="83A598"/>
                           </a:solidFill>
                           <a:latin typeface="Iosevka Term" panose="02000509030000000004" pitchFamily="49" charset="0"/>
                           <a:ea typeface="Iosevka Term" panose="02000509030000000004" pitchFamily="49" charset="0"/>
@@ -10438,18 +10676,18 @@
                           <a:ea typeface="Iosevka Term" panose="02000509030000000004" pitchFamily="49" charset="0"/>
                           <a:cs typeface="Iosevka Term" panose="02000509030000000004" pitchFamily="49" charset="0"/>
                         </a:rPr>
-                        <a:t>    </a:t>
-                      </a:r>
-                      <a:r>
-                        <a:rPr lang="en-US" sz="1200" dirty="0">
-                          <a:solidFill>
-                            <a:srgbClr val="FE8019"/>
-                          </a:solidFill>
-                          <a:latin typeface="Iosevka Term" panose="02000509030000000004" pitchFamily="49" charset="0"/>
-                          <a:ea typeface="Iosevka Term" panose="02000509030000000004" pitchFamily="49" charset="0"/>
-                          <a:cs typeface="Iosevka Term" panose="02000509030000000004" pitchFamily="49" charset="0"/>
-                        </a:rPr>
-                        <a:t> y</a:t>
+                        <a:t>   </a:t>
+                      </a:r>
+                      <a:r>
+                        <a:rPr lang="en-US" sz="1200" dirty="0">
+                          <a:solidFill>
+                            <a:srgbClr val="FE8019"/>
+                          </a:solidFill>
+                          <a:latin typeface="Iosevka Term" panose="02000509030000000004" pitchFamily="49" charset="0"/>
+                          <a:ea typeface="Iosevka Term" panose="02000509030000000004" pitchFamily="49" charset="0"/>
+                          <a:cs typeface="Iosevka Term" panose="02000509030000000004" pitchFamily="49" charset="0"/>
+                        </a:rPr>
+                        <a:t>}</a:t>
                       </a:r>
                     </a:p>
                   </a:txBody>

</xml_diff>

<commit_message>
chore: exported presentation into images
</commit_message>
<xml_diff>
--- a/docs/presentation.pptx
+++ b/docs/presentation.pptx
@@ -201,7 +201,7 @@
           <a:p>
             <a:fld id="{F5521292-B78C-6242-824F-8F34F248BAE2}" type="datetimeFigureOut">
               <a:rPr lang="en-US" smtClean="0"/>
-              <a:t>4/19/23</a:t>
+              <a:t>4/20/23</a:t>
             </a:fld>
             <a:endParaRPr lang="en-US"/>
           </a:p>
@@ -702,7 +702,7 @@
           <a:p>
             <a:fld id="{3BC053AF-4B5D-9141-9DA9-3C6B8D1E77C0}" type="datetimeFigureOut">
               <a:rPr lang="en-US" smtClean="0"/>
-              <a:t>4/19/23</a:t>
+              <a:t>4/20/23</a:t>
             </a:fld>
             <a:endParaRPr lang="en-US"/>
           </a:p>
@@ -902,7 +902,7 @@
           <a:p>
             <a:fld id="{3BC053AF-4B5D-9141-9DA9-3C6B8D1E77C0}" type="datetimeFigureOut">
               <a:rPr lang="en-US" smtClean="0"/>
-              <a:t>4/19/23</a:t>
+              <a:t>4/20/23</a:t>
             </a:fld>
             <a:endParaRPr lang="en-US"/>
           </a:p>
@@ -1112,7 +1112,7 @@
           <a:p>
             <a:fld id="{3BC053AF-4B5D-9141-9DA9-3C6B8D1E77C0}" type="datetimeFigureOut">
               <a:rPr lang="en-US" smtClean="0"/>
-              <a:t>4/19/23</a:t>
+              <a:t>4/20/23</a:t>
             </a:fld>
             <a:endParaRPr lang="en-US"/>
           </a:p>
@@ -1312,7 +1312,7 @@
           <a:p>
             <a:fld id="{3BC053AF-4B5D-9141-9DA9-3C6B8D1E77C0}" type="datetimeFigureOut">
               <a:rPr lang="en-US" smtClean="0"/>
-              <a:t>4/19/23</a:t>
+              <a:t>4/20/23</a:t>
             </a:fld>
             <a:endParaRPr lang="en-US"/>
           </a:p>
@@ -1588,7 +1588,7 @@
           <a:p>
             <a:fld id="{3BC053AF-4B5D-9141-9DA9-3C6B8D1E77C0}" type="datetimeFigureOut">
               <a:rPr lang="en-US" smtClean="0"/>
-              <a:t>4/19/23</a:t>
+              <a:t>4/20/23</a:t>
             </a:fld>
             <a:endParaRPr lang="en-US"/>
           </a:p>
@@ -1856,7 +1856,7 @@
           <a:p>
             <a:fld id="{3BC053AF-4B5D-9141-9DA9-3C6B8D1E77C0}" type="datetimeFigureOut">
               <a:rPr lang="en-US" smtClean="0"/>
-              <a:t>4/19/23</a:t>
+              <a:t>4/20/23</a:t>
             </a:fld>
             <a:endParaRPr lang="en-US"/>
           </a:p>
@@ -2271,7 +2271,7 @@
           <a:p>
             <a:fld id="{3BC053AF-4B5D-9141-9DA9-3C6B8D1E77C0}" type="datetimeFigureOut">
               <a:rPr lang="en-US" smtClean="0"/>
-              <a:t>4/19/23</a:t>
+              <a:t>4/20/23</a:t>
             </a:fld>
             <a:endParaRPr lang="en-US"/>
           </a:p>
@@ -2413,7 +2413,7 @@
           <a:p>
             <a:fld id="{3BC053AF-4B5D-9141-9DA9-3C6B8D1E77C0}" type="datetimeFigureOut">
               <a:rPr lang="en-US" smtClean="0"/>
-              <a:t>4/19/23</a:t>
+              <a:t>4/20/23</a:t>
             </a:fld>
             <a:endParaRPr lang="en-US"/>
           </a:p>
@@ -2526,7 +2526,7 @@
           <a:p>
             <a:fld id="{3BC053AF-4B5D-9141-9DA9-3C6B8D1E77C0}" type="datetimeFigureOut">
               <a:rPr lang="en-US" smtClean="0"/>
-              <a:t>4/19/23</a:t>
+              <a:t>4/20/23</a:t>
             </a:fld>
             <a:endParaRPr lang="en-US"/>
           </a:p>
@@ -2839,7 +2839,7 @@
           <a:p>
             <a:fld id="{3BC053AF-4B5D-9141-9DA9-3C6B8D1E77C0}" type="datetimeFigureOut">
               <a:rPr lang="en-US" smtClean="0"/>
-              <a:t>4/19/23</a:t>
+              <a:t>4/20/23</a:t>
             </a:fld>
             <a:endParaRPr lang="en-US"/>
           </a:p>
@@ -3128,7 +3128,7 @@
           <a:p>
             <a:fld id="{3BC053AF-4B5D-9141-9DA9-3C6B8D1E77C0}" type="datetimeFigureOut">
               <a:rPr lang="en-US" smtClean="0"/>
-              <a:t>4/19/23</a:t>
+              <a:t>4/20/23</a:t>
             </a:fld>
             <a:endParaRPr lang="en-US"/>
           </a:p>
@@ -3374,7 +3374,7 @@
           <a:p>
             <a:fld id="{3BC053AF-4B5D-9141-9DA9-3C6B8D1E77C0}" type="datetimeFigureOut">
               <a:rPr lang="en-US" smtClean="0"/>
-              <a:t>4/19/23</a:t>
+              <a:t>4/20/23</a:t>
             </a:fld>
             <a:endParaRPr lang="en-US"/>
           </a:p>

</xml_diff>